<commit_message>
Please enter the commit message for your changes. Lines starting  with '' will be ignored, and an empty message aborts the commit.
 On branch master
 Changes to be committed:
	modified:   "ER\345\233\276.pptx"
	new file:   lab2_php/administrator.php
	new file:   lab2_php/deal_with_sign_up.php
	new file:   lab2_php/index.php
	new file:   lab2_php/search_for_order.php
	new file:   lab2_php/search_for_route.php
	new file:   lab2_php/search_for_train_ID.php
	new file:   lab2_php/service.php
	new file:   lab2_php/service_4.php
	new file:   lab2_php/service_5.php
	new file:   lab2_php/service_8.php
	new file:   lab2_php/sign_in.php
	new file:   lab2_php/sign_up.php
</commit_message>
<xml_diff>
--- a/ER图.pptx
+++ b/ER图.pptx
@@ -104,6 +104,11 @@
       </a:defRPr>
     </a:lvl9pPr>
   </p:defaultTextStyle>
+  <p:extLst>
+    <p:ext uri="{EFAFB233-063F-42B5-8137-9DF3F51BA10A}">
+      <p15:sldGuideLst xmlns:p15="http://schemas.microsoft.com/office/powerpoint/2012/main"/>
+    </p:ext>
+  </p:extLst>
 </p:presentation>
 </file>
 
@@ -254,7 +259,7 @@
           <a:p>
             <a:fld id="{335B355A-9CE7-43E5-9C02-27098613299E}" type="datetimeFigureOut">
               <a:rPr lang="zh-CN" altLang="en-US" smtClean="0"/>
-              <a:t>2020/4/17</a:t>
+              <a:t>2020/4/18</a:t>
             </a:fld>
             <a:endParaRPr lang="zh-CN" altLang="en-US"/>
           </a:p>
@@ -452,7 +457,7 @@
           <a:p>
             <a:fld id="{335B355A-9CE7-43E5-9C02-27098613299E}" type="datetimeFigureOut">
               <a:rPr lang="zh-CN" altLang="en-US" smtClean="0"/>
-              <a:t>2020/4/17</a:t>
+              <a:t>2020/4/18</a:t>
             </a:fld>
             <a:endParaRPr lang="zh-CN" altLang="en-US"/>
           </a:p>
@@ -660,7 +665,7 @@
           <a:p>
             <a:fld id="{335B355A-9CE7-43E5-9C02-27098613299E}" type="datetimeFigureOut">
               <a:rPr lang="zh-CN" altLang="en-US" smtClean="0"/>
-              <a:t>2020/4/17</a:t>
+              <a:t>2020/4/18</a:t>
             </a:fld>
             <a:endParaRPr lang="zh-CN" altLang="en-US"/>
           </a:p>
@@ -858,7 +863,7 @@
           <a:p>
             <a:fld id="{335B355A-9CE7-43E5-9C02-27098613299E}" type="datetimeFigureOut">
               <a:rPr lang="zh-CN" altLang="en-US" smtClean="0"/>
-              <a:t>2020/4/17</a:t>
+              <a:t>2020/4/18</a:t>
             </a:fld>
             <a:endParaRPr lang="zh-CN" altLang="en-US"/>
           </a:p>
@@ -1133,7 +1138,7 @@
           <a:p>
             <a:fld id="{335B355A-9CE7-43E5-9C02-27098613299E}" type="datetimeFigureOut">
               <a:rPr lang="zh-CN" altLang="en-US" smtClean="0"/>
-              <a:t>2020/4/17</a:t>
+              <a:t>2020/4/18</a:t>
             </a:fld>
             <a:endParaRPr lang="zh-CN" altLang="en-US"/>
           </a:p>
@@ -1398,7 +1403,7 @@
           <a:p>
             <a:fld id="{335B355A-9CE7-43E5-9C02-27098613299E}" type="datetimeFigureOut">
               <a:rPr lang="zh-CN" altLang="en-US" smtClean="0"/>
-              <a:t>2020/4/17</a:t>
+              <a:t>2020/4/18</a:t>
             </a:fld>
             <a:endParaRPr lang="zh-CN" altLang="en-US"/>
           </a:p>
@@ -1810,7 +1815,7 @@
           <a:p>
             <a:fld id="{335B355A-9CE7-43E5-9C02-27098613299E}" type="datetimeFigureOut">
               <a:rPr lang="zh-CN" altLang="en-US" smtClean="0"/>
-              <a:t>2020/4/17</a:t>
+              <a:t>2020/4/18</a:t>
             </a:fld>
             <a:endParaRPr lang="zh-CN" altLang="en-US"/>
           </a:p>
@@ -1951,7 +1956,7 @@
           <a:p>
             <a:fld id="{335B355A-9CE7-43E5-9C02-27098613299E}" type="datetimeFigureOut">
               <a:rPr lang="zh-CN" altLang="en-US" smtClean="0"/>
-              <a:t>2020/4/17</a:t>
+              <a:t>2020/4/18</a:t>
             </a:fld>
             <a:endParaRPr lang="zh-CN" altLang="en-US"/>
           </a:p>
@@ -2064,7 +2069,7 @@
           <a:p>
             <a:fld id="{335B355A-9CE7-43E5-9C02-27098613299E}" type="datetimeFigureOut">
               <a:rPr lang="zh-CN" altLang="en-US" smtClean="0"/>
-              <a:t>2020/4/17</a:t>
+              <a:t>2020/4/18</a:t>
             </a:fld>
             <a:endParaRPr lang="zh-CN" altLang="en-US"/>
           </a:p>
@@ -2375,7 +2380,7 @@
           <a:p>
             <a:fld id="{335B355A-9CE7-43E5-9C02-27098613299E}" type="datetimeFigureOut">
               <a:rPr lang="zh-CN" altLang="en-US" smtClean="0"/>
-              <a:t>2020/4/17</a:t>
+              <a:t>2020/4/18</a:t>
             </a:fld>
             <a:endParaRPr lang="zh-CN" altLang="en-US"/>
           </a:p>
@@ -2663,7 +2668,7 @@
           <a:p>
             <a:fld id="{335B355A-9CE7-43E5-9C02-27098613299E}" type="datetimeFigureOut">
               <a:rPr lang="zh-CN" altLang="en-US" smtClean="0"/>
-              <a:t>2020/4/17</a:t>
+              <a:t>2020/4/18</a:t>
             </a:fld>
             <a:endParaRPr lang="zh-CN" altLang="en-US"/>
           </a:p>
@@ -2904,7 +2909,7 @@
           <a:p>
             <a:fld id="{335B355A-9CE7-43E5-9C02-27098613299E}" type="datetimeFigureOut">
               <a:rPr lang="zh-CN" altLang="en-US" smtClean="0"/>
-              <a:t>2020/4/17</a:t>
+              <a:t>2020/4/18</a:t>
             </a:fld>
             <a:endParaRPr lang="zh-CN" altLang="en-US"/>
           </a:p>
@@ -3937,7 +3942,7 @@
         </p:nvSpPr>
         <p:spPr>
           <a:xfrm>
-            <a:off x="3031481" y="2459319"/>
+            <a:off x="2885639" y="2366370"/>
             <a:ext cx="947510" cy="444417"/>
           </a:xfrm>
           <a:prstGeom prst="ellipse">
@@ -5845,8 +5850,8 @@
         </p:nvCxnSpPr>
         <p:spPr>
           <a:xfrm flipV="1">
-            <a:off x="2885639" y="2681528"/>
-            <a:ext cx="145842" cy="621317"/>
+            <a:off x="2885639" y="2588579"/>
+            <a:ext cx="0" cy="714266"/>
           </a:xfrm>
           <a:prstGeom prst="line">
             <a:avLst/>

</xml_diff>